<commit_message>
poster updates with Ishaan's analysis
</commit_message>
<xml_diff>
--- a/poster/assessingslate_36x24_v2.pptx
+++ b/poster/assessingslate_36x24_v2.pptx
@@ -963,7 +963,7 @@
             <a:rPr lang="en-US" sz="2400" dirty="0">
               <a:latin typeface="Lucida Sans" panose="020B0602030504020204" pitchFamily="34" charset="77"/>
             </a:rPr>
-            <a:t>Principal Components Analysis</a:t>
+            <a:t>Feature Selection</a:t>
           </a:r>
         </a:p>
       </dgm:t>
@@ -1039,7 +1039,7 @@
       <dgm:spPr/>
     </dgm:pt>
     <dgm:pt modelId="{9610B204-8962-A344-9FB0-BA0ADD5719E0}" type="pres">
-      <dgm:prSet presAssocID="{AAF60776-3A7B-FF45-AB79-1EBA3C7C56EF}" presName="node" presStyleLbl="node1" presStyleIdx="0" presStyleCnt="3">
+      <dgm:prSet presAssocID="{AAF60776-3A7B-FF45-AB79-1EBA3C7C56EF}" presName="node" presStyleLbl="node1" presStyleIdx="0" presStyleCnt="3" custLinFactNeighborY="-2591">
         <dgm:presLayoutVars>
           <dgm:bulletEnabled val="1"/>
         </dgm:presLayoutVars>
@@ -1124,7 +1124,7 @@
       </dsp:nvSpPr>
       <dsp:spPr>
         <a:xfrm>
-          <a:off x="0" y="2355"/>
+          <a:off x="0" y="0"/>
           <a:ext cx="2712059" cy="1204905"/>
         </a:xfrm>
         <a:prstGeom prst="roundRect">
@@ -1194,7 +1194,7 @@
         </a:p>
       </dsp:txBody>
       <dsp:txXfrm>
-        <a:off x="35290" y="37645"/>
+        <a:off x="35290" y="35290"/>
         <a:ext cx="2641479" cy="1134325"/>
       </dsp:txXfrm>
     </dsp:sp>
@@ -1205,8 +1205,8 @@
       </dsp:nvSpPr>
       <dsp:spPr>
         <a:xfrm rot="5400000">
-          <a:off x="1130110" y="1237383"/>
-          <a:ext cx="451839" cy="542207"/>
+          <a:off x="1129226" y="1236205"/>
+          <a:ext cx="453606" cy="542207"/>
         </a:xfrm>
         <a:prstGeom prst="rightArrow">
           <a:avLst>
@@ -1266,8 +1266,8 @@
         </a:p>
       </dsp:txBody>
       <dsp:txXfrm rot="-5400000">
-        <a:off x="1193367" y="1282567"/>
-        <a:ext cx="325325" cy="316287"/>
+        <a:off x="1193367" y="1280505"/>
+        <a:ext cx="325325" cy="317524"/>
       </dsp:txXfrm>
     </dsp:sp>
     <dsp:sp modelId="{B9137127-FADD-8640-9DD5-6FA13AF4FAD1}">
@@ -1342,7 +1342,7 @@
             <a:rPr lang="en-US" sz="2400" kern="1200" dirty="0">
               <a:latin typeface="Lucida Sans" panose="020B0602030504020204" pitchFamily="34" charset="77"/>
             </a:rPr>
-            <a:t>Principal Components Analysis</a:t>
+            <a:t>Feature Selection</a:t>
           </a:r>
         </a:p>
       </dsp:txBody>
@@ -3525,6 +3525,41 @@
 <file path=ppt/slides/slide1.xml><?xml version="1.0" encoding="utf-8"?>
 <p:sld xmlns:a="http://schemas.openxmlformats.org/drawingml/2006/main" xmlns:r="http://schemas.openxmlformats.org/officeDocument/2006/relationships" xmlns:p="http://schemas.openxmlformats.org/presentationml/2006/main">
   <p:cSld>
+    <p:bg>
+      <p:bgPr>
+        <a:gradFill flip="none" rotWithShape="1">
+          <a:gsLst>
+            <a:gs pos="0">
+              <a:schemeClr val="accent4">
+                <a:lumMod val="5000"/>
+                <a:lumOff val="95000"/>
+              </a:schemeClr>
+            </a:gs>
+            <a:gs pos="74000">
+              <a:schemeClr val="accent4">
+                <a:lumMod val="45000"/>
+                <a:lumOff val="55000"/>
+              </a:schemeClr>
+            </a:gs>
+            <a:gs pos="83000">
+              <a:schemeClr val="accent4">
+                <a:lumMod val="45000"/>
+                <a:lumOff val="55000"/>
+              </a:schemeClr>
+            </a:gs>
+            <a:gs pos="100000">
+              <a:schemeClr val="accent4">
+                <a:lumMod val="30000"/>
+                <a:lumOff val="70000"/>
+              </a:schemeClr>
+            </a:gs>
+          </a:gsLst>
+          <a:lin ang="5400000" scaled="1"/>
+          <a:tileRect/>
+        </a:gradFill>
+        <a:effectLst/>
+      </p:bgPr>
+    </p:bg>
     <p:spTree>
       <p:nvGrpSpPr>
         <p:cNvPr id="1" name=""/>
@@ -4278,7 +4313,7 @@
         <p:spPr>
           <a:xfrm>
             <a:off x="495300" y="4686766"/>
-            <a:ext cx="7562175" cy="6886276"/>
+            <a:ext cx="7562175" cy="6943732"/>
           </a:xfrm>
           <a:prstGeom prst="roundRect">
             <a:avLst>
@@ -4468,8 +4503,8 @@
         </p:nvSpPr>
         <p:spPr>
           <a:xfrm>
-            <a:off x="495300" y="12133008"/>
-            <a:ext cx="7562175" cy="9279214"/>
+            <a:off x="495300" y="12092163"/>
+            <a:ext cx="7562175" cy="9320059"/>
           </a:xfrm>
           <a:prstGeom prst="roundRect">
             <a:avLst>
@@ -4617,174 +4652,14 @@
       </p:sp>
       <p:sp>
         <p:nvSpPr>
-          <p:cNvPr id="44" name="Rectangle: Rounded Corners 43"/>
-          <p:cNvSpPr/>
-          <p:nvPr/>
-        </p:nvSpPr>
-        <p:spPr>
-          <a:xfrm>
-            <a:off x="8592866" y="4708443"/>
-            <a:ext cx="7562175" cy="4200655"/>
-          </a:xfrm>
-          <a:prstGeom prst="roundRect">
-            <a:avLst>
-              <a:gd name="adj" fmla="val 2700"/>
-            </a:avLst>
-          </a:prstGeom>
-          <a:solidFill>
-            <a:schemeClr val="accent5">
-              <a:lumMod val="20000"/>
-              <a:lumOff val="80000"/>
-            </a:schemeClr>
-          </a:solidFill>
-          <a:ln w="76200">
-            <a:solidFill>
-              <a:schemeClr val="accent3">
-                <a:lumMod val="50000"/>
-              </a:schemeClr>
-            </a:solidFill>
-          </a:ln>
-        </p:spPr>
-        <p:style>
-          <a:lnRef idx="2">
-            <a:schemeClr val="accent1">
-              <a:shade val="50000"/>
-            </a:schemeClr>
-          </a:lnRef>
-          <a:fillRef idx="1">
-            <a:schemeClr val="accent1"/>
-          </a:fillRef>
-          <a:effectRef idx="0">
-            <a:schemeClr val="accent1"/>
-          </a:effectRef>
-          <a:fontRef idx="minor">
-            <a:schemeClr val="lt1"/>
-          </a:fontRef>
-        </p:style>
-        <p:txBody>
-          <a:bodyPr rtlCol="0" anchor="ctr"/>
-          <a:lstStyle>
-            <a:defPPr>
-              <a:defRPr kern="1200"/>
-            </a:defPPr>
-          </a:lstStyle>
-          <a:p>
-            <a:pPr algn="ctr"/>
-            <a:endParaRPr lang="en-US" sz="6400">
-              <a:solidFill>
-                <a:schemeClr val="tx1">
-                  <a:lumMod val="50000"/>
-                </a:schemeClr>
-              </a:solidFill>
-              <a:latin typeface="Lucida Sans" panose="020B0602030504020204" pitchFamily="34" charset="77"/>
-            </a:endParaRPr>
-          </a:p>
-        </p:txBody>
-      </p:sp>
-      <p:sp>
-        <p:nvSpPr>
-          <p:cNvPr id="88" name="TextBox 87">
-            <a:extLst>
-              <a:ext uri="{FF2B5EF4-FFF2-40B4-BE49-F238E27FC236}">
-                <a16:creationId xmlns:a16="http://schemas.microsoft.com/office/drawing/2014/main" id="{42B0A569-B3B2-4D39-9EF7-F3CC8A0EDD42}"/>
-              </a:ext>
-            </a:extLst>
-          </p:cNvPr>
-          <p:cNvSpPr txBox="1"/>
-          <p:nvPr/>
-        </p:nvSpPr>
-        <p:spPr>
-          <a:xfrm>
-            <a:off x="8936601" y="5433534"/>
-            <a:ext cx="6874704" cy="338554"/>
-          </a:xfrm>
-          <a:prstGeom prst="rect">
-            <a:avLst/>
-          </a:prstGeom>
-          <a:noFill/>
-        </p:spPr>
-        <p:txBody>
-          <a:bodyPr wrap="square" rtlCol="0">
-            <a:spAutoFit/>
-          </a:bodyPr>
-          <a:lstStyle>
-            <a:defPPr>
-              <a:defRPr kern="1200"/>
-            </a:defPPr>
-          </a:lstStyle>
-          <a:p>
-            <a:r>
-              <a:rPr lang="en-US" sz="1600">
-                <a:solidFill>
-                  <a:schemeClr val="tx1">
-                    <a:lumMod val="50000"/>
-                  </a:schemeClr>
-                </a:solidFill>
-                <a:latin typeface="Lucida Sans" panose="020B0602030504020204" pitchFamily="34" charset="77"/>
-                <a:ea typeface="Open Sans" panose="020B0606030504020204" pitchFamily="34" charset="0"/>
-                <a:cs typeface="Open Sans" panose="020B0606030504020204" pitchFamily="34" charset="0"/>
-              </a:rPr>
-              <a:t>Add your information, graphs and images to this section.</a:t>
-            </a:r>
-          </a:p>
-        </p:txBody>
-      </p:sp>
-      <p:sp>
-        <p:nvSpPr>
-          <p:cNvPr id="89" name="TextBox 88">
-            <a:extLst>
-              <a:ext uri="{FF2B5EF4-FFF2-40B4-BE49-F238E27FC236}">
-                <a16:creationId xmlns:a16="http://schemas.microsoft.com/office/drawing/2014/main" id="{CA3FBD3B-628E-43FF-A33F-32B15438C990}"/>
-              </a:ext>
-            </a:extLst>
-          </p:cNvPr>
-          <p:cNvSpPr txBox="1"/>
-          <p:nvPr/>
-        </p:nvSpPr>
-        <p:spPr>
-          <a:xfrm>
-            <a:off x="8936601" y="4988260"/>
-            <a:ext cx="6874704" cy="461665"/>
-          </a:xfrm>
-          <a:prstGeom prst="rect">
-            <a:avLst/>
-          </a:prstGeom>
-          <a:noFill/>
-        </p:spPr>
-        <p:txBody>
-          <a:bodyPr wrap="square" rtlCol="0">
-            <a:spAutoFit/>
-          </a:bodyPr>
-          <a:lstStyle>
-            <a:defPPr>
-              <a:defRPr kern="1200"/>
-            </a:defPPr>
-          </a:lstStyle>
-          <a:p>
-            <a:r>
-              <a:rPr lang="en-US" sz="2400" b="1" dirty="0">
-                <a:solidFill>
-                  <a:schemeClr val="tx1">
-                    <a:lumMod val="50000"/>
-                  </a:schemeClr>
-                </a:solidFill>
-                <a:latin typeface="Lucida Sans" panose="020B0602030504020204" pitchFamily="34" charset="77"/>
-              </a:rPr>
-              <a:t>Data</a:t>
-            </a:r>
-          </a:p>
-        </p:txBody>
-      </p:sp>
-      <p:sp>
-        <p:nvSpPr>
           <p:cNvPr id="40" name="Rectangle: Rounded Corners 39"/>
           <p:cNvSpPr/>
           <p:nvPr/>
         </p:nvSpPr>
         <p:spPr>
           <a:xfrm>
-            <a:off x="8592866" y="9435085"/>
-            <a:ext cx="7562175" cy="11977133"/>
+            <a:off x="8592866" y="4708441"/>
+            <a:ext cx="7562175" cy="5735429"/>
           </a:xfrm>
           <a:prstGeom prst="roundRect">
             <a:avLst>
@@ -4850,8 +4725,8 @@
         </p:nvSpPr>
         <p:spPr>
           <a:xfrm>
-            <a:off x="8936601" y="10231731"/>
-            <a:ext cx="6874704" cy="338554"/>
+            <a:off x="11741426" y="5500848"/>
+            <a:ext cx="4069879" cy="1077218"/>
           </a:xfrm>
           <a:prstGeom prst="rect">
             <a:avLst/>
@@ -4879,7 +4754,7 @@
                 <a:ea typeface="Open Sans" panose="020B0606030504020204" pitchFamily="34" charset="0"/>
                 <a:cs typeface="Open Sans" panose="020B0606030504020204" pitchFamily="34" charset="0"/>
               </a:rPr>
-              <a:t>Add your information, graphs and images to this section.</a:t>
+              <a:t>For this study, there were three largely categorical (enormous) datasets. Each were cleaned for their unique aspects of the survey. </a:t>
             </a:r>
           </a:p>
         </p:txBody>
@@ -4898,7 +4773,7 @@
         </p:nvSpPr>
         <p:spPr>
           <a:xfrm>
-            <a:off x="8936601" y="9786458"/>
+            <a:off x="8936601" y="4886798"/>
             <a:ext cx="6874704" cy="461665"/>
           </a:xfrm>
           <a:prstGeom prst="rect">
@@ -4917,7 +4792,7 @@
           </a:lstStyle>
           <a:p>
             <a:r>
-              <a:rPr lang="en-US" sz="2400" b="1">
+              <a:rPr lang="en-US" sz="2400" b="1" dirty="0">
                 <a:solidFill>
                   <a:schemeClr val="tx1">
                     <a:lumMod val="50000"/>
@@ -5098,13 +4973,13 @@
           <p:nvPr>
             <p:extLst>
               <p:ext uri="{D42A27DB-BD31-4B8C-83A1-F6EECF244321}">
-                <p14:modId xmlns:p14="http://schemas.microsoft.com/office/powerpoint/2010/main" val="2397224312"/>
+                <p14:modId xmlns:p14="http://schemas.microsoft.com/office/powerpoint/2010/main" val="1314838268"/>
               </p:ext>
             </p:extLst>
           </p:nvPr>
         </p:nvGraphicFramePr>
         <p:xfrm>
-          <a:off x="8936601" y="10972800"/>
+          <a:off x="8936601" y="5458387"/>
           <a:ext cx="2712060" cy="4824332"/>
         </p:xfrm>
         <a:graphic>
@@ -5300,6 +5175,429 @@
           </a:fontRef>
         </p:style>
       </p:cxnSp>
+      <p:sp>
+        <p:nvSpPr>
+          <p:cNvPr id="3" name="Rectangle: Rounded Corners 39">
+            <a:extLst>
+              <a:ext uri="{FF2B5EF4-FFF2-40B4-BE49-F238E27FC236}">
+                <a16:creationId xmlns:a16="http://schemas.microsoft.com/office/drawing/2014/main" id="{EDBBB79A-456E-5D04-158D-63F7A4A35043}"/>
+              </a:ext>
+            </a:extLst>
+          </p:cNvPr>
+          <p:cNvSpPr/>
+          <p:nvPr/>
+        </p:nvSpPr>
+        <p:spPr>
+          <a:xfrm>
+            <a:off x="8592866" y="10972800"/>
+            <a:ext cx="7562175" cy="10439416"/>
+          </a:xfrm>
+          <a:prstGeom prst="roundRect">
+            <a:avLst>
+              <a:gd name="adj" fmla="val 1822"/>
+            </a:avLst>
+          </a:prstGeom>
+          <a:solidFill>
+            <a:schemeClr val="accent5">
+              <a:lumMod val="20000"/>
+              <a:lumOff val="80000"/>
+            </a:schemeClr>
+          </a:solidFill>
+          <a:ln w="76200">
+            <a:solidFill>
+              <a:schemeClr val="accent3">
+                <a:lumMod val="50000"/>
+              </a:schemeClr>
+            </a:solidFill>
+          </a:ln>
+        </p:spPr>
+        <p:style>
+          <a:lnRef idx="2">
+            <a:schemeClr val="accent1">
+              <a:shade val="50000"/>
+            </a:schemeClr>
+          </a:lnRef>
+          <a:fillRef idx="1">
+            <a:schemeClr val="accent1"/>
+          </a:fillRef>
+          <a:effectRef idx="0">
+            <a:schemeClr val="accent1"/>
+          </a:effectRef>
+          <a:fontRef idx="minor">
+            <a:schemeClr val="lt1"/>
+          </a:fontRef>
+        </p:style>
+        <p:txBody>
+          <a:bodyPr rtlCol="0" anchor="ctr"/>
+          <a:lstStyle>
+            <a:defPPr>
+              <a:defRPr kern="1200"/>
+            </a:defPPr>
+          </a:lstStyle>
+          <a:p>
+            <a:pPr algn="ctr"/>
+            <a:endParaRPr lang="en-US" sz="6400">
+              <a:latin typeface="Lucida Sans" panose="020B0602030504020204" pitchFamily="34" charset="77"/>
+            </a:endParaRPr>
+          </a:p>
+        </p:txBody>
+      </p:sp>
+      <p:sp>
+        <p:nvSpPr>
+          <p:cNvPr id="6" name="TextBox 5">
+            <a:extLst>
+              <a:ext uri="{FF2B5EF4-FFF2-40B4-BE49-F238E27FC236}">
+                <a16:creationId xmlns:a16="http://schemas.microsoft.com/office/drawing/2014/main" id="{EFE73332-74DE-9430-6E0C-7C20E6E3B4CA}"/>
+              </a:ext>
+            </a:extLst>
+          </p:cNvPr>
+          <p:cNvSpPr txBox="1"/>
+          <p:nvPr/>
+        </p:nvSpPr>
+        <p:spPr>
+          <a:xfrm>
+            <a:off x="8936601" y="11630498"/>
+            <a:ext cx="6874704" cy="461665"/>
+          </a:xfrm>
+          <a:prstGeom prst="rect">
+            <a:avLst/>
+          </a:prstGeom>
+          <a:noFill/>
+        </p:spPr>
+        <p:txBody>
+          <a:bodyPr wrap="square" rtlCol="0">
+            <a:spAutoFit/>
+          </a:bodyPr>
+          <a:lstStyle>
+            <a:defPPr>
+              <a:defRPr kern="1200"/>
+            </a:defPPr>
+          </a:lstStyle>
+          <a:p>
+            <a:r>
+              <a:rPr lang="en-US" sz="2400" b="1" dirty="0">
+                <a:solidFill>
+                  <a:schemeClr val="tx1">
+                    <a:lumMod val="50000"/>
+                  </a:schemeClr>
+                </a:solidFill>
+                <a:latin typeface="Lucida Sans" panose="020B0602030504020204" pitchFamily="34" charset="77"/>
+              </a:rPr>
+              <a:t>Analysis</a:t>
+            </a:r>
+          </a:p>
+        </p:txBody>
+      </p:sp>
+      <p:sp>
+        <p:nvSpPr>
+          <p:cNvPr id="8" name="TextBox 7">
+            <a:extLst>
+              <a:ext uri="{FF2B5EF4-FFF2-40B4-BE49-F238E27FC236}">
+                <a16:creationId xmlns:a16="http://schemas.microsoft.com/office/drawing/2014/main" id="{D3508CB3-22B3-918E-905C-AA704951A32B}"/>
+              </a:ext>
+            </a:extLst>
+          </p:cNvPr>
+          <p:cNvSpPr txBox="1"/>
+          <p:nvPr/>
+        </p:nvSpPr>
+        <p:spPr>
+          <a:xfrm>
+            <a:off x="8936601" y="12421883"/>
+            <a:ext cx="6874704" cy="2308324"/>
+          </a:xfrm>
+          <a:prstGeom prst="rect">
+            <a:avLst/>
+          </a:prstGeom>
+          <a:noFill/>
+        </p:spPr>
+        <p:txBody>
+          <a:bodyPr wrap="square" rtlCol="0">
+            <a:spAutoFit/>
+          </a:bodyPr>
+          <a:lstStyle>
+            <a:defPPr>
+              <a:defRPr kern="1200"/>
+            </a:defPPr>
+          </a:lstStyle>
+          <a:p>
+            <a:r>
+              <a:rPr lang="en-US" sz="1600" dirty="0">
+                <a:solidFill>
+                  <a:schemeClr val="tx1">
+                    <a:lumMod val="50000"/>
+                  </a:schemeClr>
+                </a:solidFill>
+                <a:latin typeface="Lucida Sans" panose="020B0602030504020204" pitchFamily="34" charset="77"/>
+                <a:ea typeface="Open Sans" panose="020B0606030504020204" pitchFamily="34" charset="0"/>
+                <a:cs typeface="Open Sans" panose="020B0606030504020204" pitchFamily="34" charset="0"/>
+              </a:rPr>
+              <a:t>In the analysis of the 001 dataset for migration in Bangladesh, we perform feature selection using both numerical and categorical features. We aim to identify the most relevant values that can be </a:t>
+            </a:r>
+            <a:r>
+              <a:rPr lang="en-US" sz="1600" dirty="0" err="1">
+                <a:solidFill>
+                  <a:schemeClr val="tx1">
+                    <a:lumMod val="50000"/>
+                  </a:schemeClr>
+                </a:solidFill>
+                <a:latin typeface="Lucida Sans" panose="020B0602030504020204" pitchFamily="34" charset="77"/>
+                <a:ea typeface="Open Sans" panose="020B0606030504020204" pitchFamily="34" charset="0"/>
+                <a:cs typeface="Open Sans" panose="020B0606030504020204" pitchFamily="34" charset="0"/>
+              </a:rPr>
+              <a:t>subsetted</a:t>
+            </a:r>
+            <a:r>
+              <a:rPr lang="en-US" sz="1600" dirty="0">
+                <a:solidFill>
+                  <a:schemeClr val="tx1">
+                    <a:lumMod val="50000"/>
+                  </a:schemeClr>
+                </a:solidFill>
+                <a:latin typeface="Lucida Sans" panose="020B0602030504020204" pitchFamily="34" charset="77"/>
+                <a:ea typeface="Open Sans" panose="020B0606030504020204" pitchFamily="34" charset="0"/>
+                <a:cs typeface="Open Sans" panose="020B0606030504020204" pitchFamily="34" charset="0"/>
+              </a:rPr>
+              <a:t> based on our Y target variable, which is to determine if environmental change due to temperature increase/decrease is a factor of migration. To achieve this, we use ANOVA based on the f-test for numerical features, and Chi-square test based on the p-value for categorical features. We determine the categorical feature to be significant if the p-value is less than 0.05.</a:t>
+            </a:r>
+          </a:p>
+        </p:txBody>
+      </p:sp>
+      <p:sp>
+        <p:nvSpPr>
+          <p:cNvPr id="10" name="TextBox 9">
+            <a:extLst>
+              <a:ext uri="{FF2B5EF4-FFF2-40B4-BE49-F238E27FC236}">
+                <a16:creationId xmlns:a16="http://schemas.microsoft.com/office/drawing/2014/main" id="{1F9FDBAA-B0EC-30D0-9C02-32D76A0BDC7F}"/>
+              </a:ext>
+            </a:extLst>
+          </p:cNvPr>
+          <p:cNvSpPr txBox="1"/>
+          <p:nvPr/>
+        </p:nvSpPr>
+        <p:spPr>
+          <a:xfrm>
+            <a:off x="8943895" y="12092163"/>
+            <a:ext cx="6874704" cy="369332"/>
+          </a:xfrm>
+          <a:prstGeom prst="rect">
+            <a:avLst/>
+          </a:prstGeom>
+          <a:noFill/>
+        </p:spPr>
+        <p:txBody>
+          <a:bodyPr wrap="square" rtlCol="0">
+            <a:spAutoFit/>
+          </a:bodyPr>
+          <a:lstStyle>
+            <a:defPPr>
+              <a:defRPr kern="1200"/>
+            </a:defPPr>
+          </a:lstStyle>
+          <a:p>
+            <a:r>
+              <a:rPr lang="en-US" sz="1800" b="1" dirty="0">
+                <a:solidFill>
+                  <a:schemeClr val="tx1">
+                    <a:lumMod val="50000"/>
+                  </a:schemeClr>
+                </a:solidFill>
+                <a:latin typeface="Lucida Sans" panose="020B0602030504020204" pitchFamily="34" charset="77"/>
+              </a:rPr>
+              <a:t>Dataset 001</a:t>
+            </a:r>
+          </a:p>
+        </p:txBody>
+      </p:sp>
+      <p:sp>
+        <p:nvSpPr>
+          <p:cNvPr id="11" name="TextBox 10">
+            <a:extLst>
+              <a:ext uri="{FF2B5EF4-FFF2-40B4-BE49-F238E27FC236}">
+                <a16:creationId xmlns:a16="http://schemas.microsoft.com/office/drawing/2014/main" id="{BF336166-895D-D220-2769-43DF98987B57}"/>
+              </a:ext>
+            </a:extLst>
+          </p:cNvPr>
+          <p:cNvSpPr txBox="1"/>
+          <p:nvPr/>
+        </p:nvSpPr>
+        <p:spPr>
+          <a:xfrm>
+            <a:off x="8936601" y="14690595"/>
+            <a:ext cx="6874704" cy="369332"/>
+          </a:xfrm>
+          <a:prstGeom prst="rect">
+            <a:avLst/>
+          </a:prstGeom>
+          <a:noFill/>
+        </p:spPr>
+        <p:txBody>
+          <a:bodyPr wrap="square" rtlCol="0">
+            <a:spAutoFit/>
+          </a:bodyPr>
+          <a:lstStyle>
+            <a:defPPr>
+              <a:defRPr kern="1200"/>
+            </a:defPPr>
+          </a:lstStyle>
+          <a:p>
+            <a:r>
+              <a:rPr lang="en-US" sz="1800" b="1" dirty="0">
+                <a:solidFill>
+                  <a:schemeClr val="tx1">
+                    <a:lumMod val="50000"/>
+                  </a:schemeClr>
+                </a:solidFill>
+                <a:latin typeface="Lucida Sans" panose="020B0602030504020204" pitchFamily="34" charset="77"/>
+              </a:rPr>
+              <a:t>Dataset 002</a:t>
+            </a:r>
+          </a:p>
+        </p:txBody>
+      </p:sp>
+      <p:sp>
+        <p:nvSpPr>
+          <p:cNvPr id="17" name="TextBox 16">
+            <a:extLst>
+              <a:ext uri="{FF2B5EF4-FFF2-40B4-BE49-F238E27FC236}">
+                <a16:creationId xmlns:a16="http://schemas.microsoft.com/office/drawing/2014/main" id="{64689E21-F5FB-D49A-C74F-3E570BA5E0D4}"/>
+              </a:ext>
+            </a:extLst>
+          </p:cNvPr>
+          <p:cNvSpPr txBox="1"/>
+          <p:nvPr/>
+        </p:nvSpPr>
+        <p:spPr>
+          <a:xfrm>
+            <a:off x="11748720" y="7325518"/>
+            <a:ext cx="4069879" cy="830997"/>
+          </a:xfrm>
+          <a:prstGeom prst="rect">
+            <a:avLst/>
+          </a:prstGeom>
+          <a:noFill/>
+        </p:spPr>
+        <p:txBody>
+          <a:bodyPr wrap="square" rtlCol="0">
+            <a:spAutoFit/>
+          </a:bodyPr>
+          <a:lstStyle>
+            <a:defPPr>
+              <a:defRPr kern="1200"/>
+            </a:defPPr>
+          </a:lstStyle>
+          <a:p>
+            <a:r>
+              <a:rPr lang="en-US" sz="1600" dirty="0">
+                <a:solidFill>
+                  <a:schemeClr val="tx1">
+                    <a:lumMod val="50000"/>
+                  </a:schemeClr>
+                </a:solidFill>
+                <a:latin typeface="Lucida Sans" panose="020B0602030504020204" pitchFamily="34" charset="77"/>
+                <a:ea typeface="Open Sans" panose="020B0606030504020204" pitchFamily="34" charset="0"/>
+                <a:cs typeface="Open Sans" panose="020B0606030504020204" pitchFamily="34" charset="0"/>
+              </a:rPr>
+              <a:t>Each set was used to investigate climate change’s impact on Bangladesh migratory workers. </a:t>
+            </a:r>
+          </a:p>
+        </p:txBody>
+      </p:sp>
+      <p:sp>
+        <p:nvSpPr>
+          <p:cNvPr id="18" name="TextBox 17">
+            <a:extLst>
+              <a:ext uri="{FF2B5EF4-FFF2-40B4-BE49-F238E27FC236}">
+                <a16:creationId xmlns:a16="http://schemas.microsoft.com/office/drawing/2014/main" id="{3B25B4C8-B587-545C-FE69-011B941876BB}"/>
+              </a:ext>
+            </a:extLst>
+          </p:cNvPr>
+          <p:cNvSpPr txBox="1"/>
+          <p:nvPr/>
+        </p:nvSpPr>
+        <p:spPr>
+          <a:xfrm>
+            <a:off x="11748720" y="9195143"/>
+            <a:ext cx="4069879" cy="338554"/>
+          </a:xfrm>
+          <a:prstGeom prst="rect">
+            <a:avLst/>
+          </a:prstGeom>
+          <a:noFill/>
+        </p:spPr>
+        <p:txBody>
+          <a:bodyPr wrap="square" rtlCol="0">
+            <a:spAutoFit/>
+          </a:bodyPr>
+          <a:lstStyle>
+            <a:defPPr>
+              <a:defRPr kern="1200"/>
+            </a:defPPr>
+          </a:lstStyle>
+          <a:p>
+            <a:r>
+              <a:rPr lang="en-US" sz="1600" dirty="0" err="1">
+                <a:solidFill>
+                  <a:schemeClr val="tx1">
+                    <a:lumMod val="50000"/>
+                  </a:schemeClr>
+                </a:solidFill>
+                <a:highlight>
+                  <a:srgbClr val="FFFF00"/>
+                </a:highlight>
+                <a:latin typeface="Lucida Sans" panose="020B0602030504020204" pitchFamily="34" charset="77"/>
+                <a:ea typeface="Open Sans" panose="020B0606030504020204" pitchFamily="34" charset="0"/>
+                <a:cs typeface="Open Sans" panose="020B0606030504020204" pitchFamily="34" charset="0"/>
+              </a:rPr>
+              <a:t>Xxx</a:t>
+            </a:r>
+            <a:r>
+              <a:rPr lang="en-US" sz="1600" dirty="0">
+                <a:solidFill>
+                  <a:schemeClr val="tx1">
+                    <a:lumMod val="50000"/>
+                  </a:schemeClr>
+                </a:solidFill>
+                <a:highlight>
+                  <a:srgbClr val="FFFF00"/>
+                </a:highlight>
+                <a:latin typeface="Lucida Sans" panose="020B0602030504020204" pitchFamily="34" charset="77"/>
+                <a:ea typeface="Open Sans" panose="020B0606030504020204" pitchFamily="34" charset="0"/>
+                <a:cs typeface="Open Sans" panose="020B0606030504020204" pitchFamily="34" charset="0"/>
+              </a:rPr>
+              <a:t> </a:t>
+            </a:r>
+            <a:r>
+              <a:rPr lang="en-US" sz="1600" dirty="0" err="1">
+                <a:solidFill>
+                  <a:schemeClr val="tx1">
+                    <a:lumMod val="50000"/>
+                  </a:schemeClr>
+                </a:solidFill>
+                <a:highlight>
+                  <a:srgbClr val="FFFF00"/>
+                </a:highlight>
+                <a:latin typeface="Lucida Sans" panose="020B0602030504020204" pitchFamily="34" charset="77"/>
+                <a:ea typeface="Open Sans" panose="020B0606030504020204" pitchFamily="34" charset="0"/>
+                <a:cs typeface="Open Sans" panose="020B0606030504020204" pitchFamily="34" charset="0"/>
+              </a:rPr>
+              <a:t>Sheeba</a:t>
+            </a:r>
+            <a:endParaRPr lang="en-US" sz="1600" dirty="0">
+              <a:solidFill>
+                <a:schemeClr val="tx1">
+                  <a:lumMod val="50000"/>
+                </a:schemeClr>
+              </a:solidFill>
+              <a:highlight>
+                <a:srgbClr val="FFFF00"/>
+              </a:highlight>
+              <a:latin typeface="Lucida Sans" panose="020B0602030504020204" pitchFamily="34" charset="77"/>
+              <a:ea typeface="Open Sans" panose="020B0606030504020204" pitchFamily="34" charset="0"/>
+              <a:cs typeface="Open Sans" panose="020B0606030504020204" pitchFamily="34" charset="0"/>
+            </a:endParaRPr>
+          </a:p>
+        </p:txBody>
+      </p:sp>
     </p:spTree>
     <p:extLst>
       <p:ext uri="{BB962C8B-B14F-4D97-AF65-F5344CB8AC3E}">

</xml_diff>

<commit_message>
powerpoint updated with donut plots
</commit_message>
<xml_diff>
--- a/poster/assessingslate_36x24_v2.pptx
+++ b/poster/assessingslate_36x24_v2.pptx
@@ -4599,8 +4599,18 @@
                 <a:ea typeface="Open Sans" panose="020B0606030504020204" pitchFamily="34" charset="0"/>
                 <a:cs typeface="Open Sans" panose="020B0606030504020204" pitchFamily="34" charset="0"/>
               </a:rPr>
-              <a:t>Add your information, graphs and images to this section.</a:t>
+              <a:t>Pulling our data </a:t>
             </a:r>
+            <a:endParaRPr lang="en-US" sz="1600" dirty="0">
+              <a:solidFill>
+                <a:schemeClr val="tx1">
+                  <a:lumMod val="50000"/>
+                </a:schemeClr>
+              </a:solidFill>
+              <a:latin typeface="Lucida Sans" panose="020B0602030504020204" pitchFamily="34" charset="77"/>
+              <a:ea typeface="Open Sans" panose="020B0606030504020204" pitchFamily="34" charset="0"/>
+              <a:cs typeface="Open Sans" panose="020B0606030504020204" pitchFamily="34" charset="0"/>
+            </a:endParaRPr>
           </a:p>
         </p:txBody>
       </p:sp>
@@ -5013,8 +5023,8 @@
         </p:blipFill>
         <p:spPr>
           <a:xfrm>
-            <a:off x="28024771" y="11387666"/>
-            <a:ext cx="6812166" cy="5207376"/>
+            <a:off x="33529368" y="14730207"/>
+            <a:ext cx="9260627" cy="7079036"/>
           </a:xfrm>
           <a:prstGeom prst="rect">
             <a:avLst/>
@@ -5049,8 +5059,8 @@
         </p:blipFill>
         <p:spPr>
           <a:xfrm>
-            <a:off x="29581577" y="5020177"/>
-            <a:ext cx="6983474" cy="3984510"/>
+            <a:off x="33529367" y="1863811"/>
+            <a:ext cx="11028943" cy="6292704"/>
           </a:xfrm>
           <a:prstGeom prst="rect">
             <a:avLst/>
@@ -5383,7 +5393,7 @@
         </p:nvSpPr>
         <p:spPr>
           <a:xfrm>
-            <a:off x="8936601" y="18376076"/>
+            <a:off x="8935139" y="14721304"/>
             <a:ext cx="6874704" cy="369332"/>
           </a:xfrm>
           <a:prstGeom prst="rect">
@@ -5587,8 +5597,8 @@
         </p:blipFill>
         <p:spPr>
           <a:xfrm>
-            <a:off x="29581577" y="8656110"/>
-            <a:ext cx="6812166" cy="3801432"/>
+            <a:off x="33529368" y="8689533"/>
+            <a:ext cx="10230698" cy="5709095"/>
           </a:xfrm>
           <a:prstGeom prst="rect">
             <a:avLst/>
@@ -5623,8 +5633,8 @@
         </p:blipFill>
         <p:spPr>
           <a:xfrm>
-            <a:off x="894178" y="12847883"/>
-            <a:ext cx="3476341" cy="2907485"/>
+            <a:off x="713335" y="13583480"/>
+            <a:ext cx="2658163" cy="2223191"/>
           </a:xfrm>
           <a:prstGeom prst="rect">
             <a:avLst/>
@@ -5659,8 +5669,8 @@
         </p:blipFill>
         <p:spPr>
           <a:xfrm>
-            <a:off x="4450914" y="17088055"/>
-            <a:ext cx="3013369" cy="3314706"/>
+            <a:off x="5772936" y="13583480"/>
+            <a:ext cx="2021084" cy="2223192"/>
           </a:xfrm>
           <a:prstGeom prst="rect">
             <a:avLst/>
@@ -5695,44 +5705,8 @@
         </p:blipFill>
         <p:spPr>
           <a:xfrm>
-            <a:off x="1419605" y="16713029"/>
-            <a:ext cx="2419773" cy="2714354"/>
-          </a:xfrm>
-          <a:prstGeom prst="rect">
-            <a:avLst/>
-          </a:prstGeom>
-        </p:spPr>
-      </p:pic>
-      <p:pic>
-        <p:nvPicPr>
-          <p:cNvPr id="73" name="Picture 72">
-            <a:extLst>
-              <a:ext uri="{FF2B5EF4-FFF2-40B4-BE49-F238E27FC236}">
-                <a16:creationId xmlns:a16="http://schemas.microsoft.com/office/drawing/2014/main" id="{8333C06B-6C52-0599-0A3E-48E080F9DDE4}"/>
-              </a:ext>
-            </a:extLst>
-          </p:cNvPr>
-          <p:cNvPicPr>
-            <a:picLocks noChangeAspect="1"/>
-          </p:cNvPicPr>
-          <p:nvPr/>
-        </p:nvPicPr>
-        <p:blipFill>
-          <a:blip r:embed="rId15">
-            <a:extLst>
-              <a:ext uri="{28A0092B-C50C-407E-A947-70E740481C1C}">
-                <a14:useLocalDpi xmlns:a14="http://schemas.microsoft.com/office/drawing/2010/main" val="0"/>
-              </a:ext>
-            </a:extLst>
-          </a:blip>
-          <a:stretch>
-            <a:fillRect/>
-          </a:stretch>
-        </p:blipFill>
-        <p:spPr>
-          <a:xfrm>
-            <a:off x="8928731" y="13060329"/>
-            <a:ext cx="6934200" cy="6426200"/>
+            <a:off x="3563455" y="13583480"/>
+            <a:ext cx="1981915" cy="2223191"/>
           </a:xfrm>
           <a:prstGeom prst="rect">
             <a:avLst/>

</xml_diff>